<commit_message>
PowerPoint slides - changed the hyper link
</commit_message>
<xml_diff>
--- a/presentation/Final_Project_Hanna.pptx
+++ b/presentation/Final_Project_Hanna.pptx
@@ -3432,7 +3432,7 @@
                             </p:stCondLst>
                             <p:childTnLst>
                               <p:par>
-                                <p:cTn id="5" presetID="1" presetClass="entr" presetSubtype="0" fill="hold" grpId="0" nodeType="clickEffect">
+                                <p:cTn id="5" presetID="1" presetClass="entr" presetSubtype="0" fill="hold" nodeType="clickEffect">
                                   <p:stCondLst>
                                     <p:cond delay="0"/>
                                   </p:stCondLst>
@@ -3440,51 +3440,6 @@
                                     <p:set>
                                       <p:cBhvr>
                                         <p:cTn id="6" dur="1" fill="hold">
-                                          <p:stCondLst>
-                                            <p:cond delay="0"/>
-                                          </p:stCondLst>
-                                        </p:cTn>
-                                        <p:tgtEl>
-                                          <p:spTgt spid="4"/>
-                                        </p:tgtEl>
-                                        <p:attrNameLst>
-                                          <p:attrName>style.visibility</p:attrName>
-                                        </p:attrNameLst>
-                                      </p:cBhvr>
-                                      <p:to>
-                                        <p:strVal val="visible"/>
-                                      </p:to>
-                                    </p:set>
-                                  </p:childTnLst>
-                                </p:cTn>
-                              </p:par>
-                            </p:childTnLst>
-                          </p:cTn>
-                        </p:par>
-                      </p:childTnLst>
-                    </p:cTn>
-                  </p:par>
-                  <p:par>
-                    <p:cTn id="7" fill="hold">
-                      <p:stCondLst>
-                        <p:cond delay="indefinite"/>
-                      </p:stCondLst>
-                      <p:childTnLst>
-                        <p:par>
-                          <p:cTn id="8" fill="hold">
-                            <p:stCondLst>
-                              <p:cond delay="0"/>
-                            </p:stCondLst>
-                            <p:childTnLst>
-                              <p:par>
-                                <p:cTn id="9" presetID="1" presetClass="entr" presetSubtype="0" fill="hold" nodeType="clickEffect">
-                                  <p:stCondLst>
-                                    <p:cond delay="0"/>
-                                  </p:stCondLst>
-                                  <p:childTnLst>
-                                    <p:set>
-                                      <p:cBhvr>
-                                        <p:cTn id="10" dur="1" fill="hold">
                                           <p:stCondLst>
                                             <p:cond delay="0"/>
                                           </p:stCondLst>
@@ -3528,7 +3483,7 @@
             </p:seq>
             <p:video>
               <p:cMediaNode vol="80000" mute="1">
-                <p:cTn id="11" repeatCount="indefinite" fill="hold" display="0">
+                <p:cTn id="7" repeatCount="indefinite" fill="hold" display="0">
                   <p:stCondLst>
                     <p:cond delay="indefinite"/>
                   </p:stCondLst>
@@ -3542,9 +3497,6 @@
         </p:cTn>
       </p:par>
     </p:tnLst>
-    <p:bldLst>
-      <p:bldP spid="4" grpId="0"/>
-    </p:bldLst>
   </p:timing>
 </p:sld>
 </file>

</xml_diff>